<commit_message>
modified:   ppt_space_brothers.pptx changed:    conclusions and added hours active plot
</commit_message>
<xml_diff>
--- a/ppt_space_brothers.pptx
+++ b/ppt_space_brothers.pptx
@@ -5,7 +5,7 @@
     <p:sldMasterId id="2147483648" r:id="rId1"/>
   </p:sldMasterIdLst>
   <p:notesMasterIdLst>
-    <p:notesMasterId r:id="rId12"/>
+    <p:notesMasterId r:id="rId13"/>
   </p:notesMasterIdLst>
   <p:sldIdLst>
     <p:sldId id="256" r:id="rId2"/>
@@ -17,7 +17,8 @@
     <p:sldId id="268" r:id="rId8"/>
     <p:sldId id="269" r:id="rId9"/>
     <p:sldId id="272" r:id="rId10"/>
-    <p:sldId id="273" r:id="rId11"/>
+    <p:sldId id="274" r:id="rId11"/>
+    <p:sldId id="273" r:id="rId12"/>
   </p:sldIdLst>
   <p:sldSz cx="12192000" cy="6858000"/>
   <p:notesSz cx="6858000" cy="9144000"/>
@@ -411,8 +412,8 @@
   </pc:docChgLst>
   <pc:docChgLst>
     <pc:chgData name="Mikhail Khmelik" userId="6a76e1f3ea945fb9" providerId="LiveId" clId="{1C12B67B-2AEB-41DF-9B92-A9E842B68D9D}"/>
-    <pc:docChg chg="undo custSel addSld delSld modSld">
-      <pc:chgData name="Mikhail Khmelik" userId="6a76e1f3ea945fb9" providerId="LiveId" clId="{1C12B67B-2AEB-41DF-9B92-A9E842B68D9D}" dt="2022-12-25T17:13:46.806" v="886" actId="20577"/>
+    <pc:docChg chg="undo custSel addSld delSld modSld sldOrd">
+      <pc:chgData name="Mikhail Khmelik" userId="6a76e1f3ea945fb9" providerId="LiveId" clId="{1C12B67B-2AEB-41DF-9B92-A9E842B68D9D}" dt="2022-12-26T23:45:04.613" v="1073" actId="20577"/>
       <pc:docMkLst>
         <pc:docMk/>
       </pc:docMkLst>
@@ -439,13 +440,13 @@
         </pc:sldMkLst>
       </pc:sldChg>
       <pc:sldChg chg="modSp mod">
-        <pc:chgData name="Mikhail Khmelik" userId="6a76e1f3ea945fb9" providerId="LiveId" clId="{1C12B67B-2AEB-41DF-9B92-A9E842B68D9D}" dt="2022-12-25T16:54:17.858" v="4" actId="1076"/>
+        <pc:chgData name="Mikhail Khmelik" userId="6a76e1f3ea945fb9" providerId="LiveId" clId="{1C12B67B-2AEB-41DF-9B92-A9E842B68D9D}" dt="2022-12-26T23:42:50.364" v="891" actId="20577"/>
         <pc:sldMkLst>
           <pc:docMk/>
           <pc:sldMk cId="851085030" sldId="263"/>
         </pc:sldMkLst>
         <pc:spChg chg="mod">
-          <ac:chgData name="Mikhail Khmelik" userId="6a76e1f3ea945fb9" providerId="LiveId" clId="{1C12B67B-2AEB-41DF-9B92-A9E842B68D9D}" dt="2022-12-25T16:54:17.858" v="4" actId="1076"/>
+          <ac:chgData name="Mikhail Khmelik" userId="6a76e1f3ea945fb9" providerId="LiveId" clId="{1C12B67B-2AEB-41DF-9B92-A9E842B68D9D}" dt="2022-12-26T23:42:50.364" v="891" actId="20577"/>
           <ac:spMkLst>
             <pc:docMk/>
             <pc:sldMk cId="851085030" sldId="263"/>
@@ -743,25 +744,48 @@
         </pc:picChg>
       </pc:sldChg>
       <pc:sldChg chg="addSp modSp new mod">
-        <pc:chgData name="Mikhail Khmelik" userId="6a76e1f3ea945fb9" providerId="LiveId" clId="{1C12B67B-2AEB-41DF-9B92-A9E842B68D9D}" dt="2022-12-25T17:12:38.964" v="811" actId="20577"/>
+        <pc:chgData name="Mikhail Khmelik" userId="6a76e1f3ea945fb9" providerId="LiveId" clId="{1C12B67B-2AEB-41DF-9B92-A9E842B68D9D}" dt="2022-12-26T23:45:04.613" v="1073" actId="20577"/>
         <pc:sldMkLst>
           <pc:docMk/>
           <pc:sldMk cId="2246430466" sldId="273"/>
         </pc:sldMkLst>
         <pc:spChg chg="mod">
-          <ac:chgData name="Mikhail Khmelik" userId="6a76e1f3ea945fb9" providerId="LiveId" clId="{1C12B67B-2AEB-41DF-9B92-A9E842B68D9D}" dt="2022-12-25T17:12:38.964" v="811" actId="20577"/>
+          <ac:chgData name="Mikhail Khmelik" userId="6a76e1f3ea945fb9" providerId="LiveId" clId="{1C12B67B-2AEB-41DF-9B92-A9E842B68D9D}" dt="2022-12-26T23:45:04.613" v="1073" actId="20577"/>
           <ac:spMkLst>
             <pc:docMk/>
             <pc:sldMk cId="2246430466" sldId="273"/>
             <ac:spMk id="2" creationId="{9CE0D559-F431-E87F-9357-ABCC790496B3}"/>
           </ac:spMkLst>
         </pc:spChg>
-        <pc:picChg chg="add">
-          <ac:chgData name="Mikhail Khmelik" userId="6a76e1f3ea945fb9" providerId="LiveId" clId="{1C12B67B-2AEB-41DF-9B92-A9E842B68D9D}" dt="2022-12-25T17:04:47.088" v="54" actId="22"/>
+        <pc:picChg chg="add mod">
+          <ac:chgData name="Mikhail Khmelik" userId="6a76e1f3ea945fb9" providerId="LiveId" clId="{1C12B67B-2AEB-41DF-9B92-A9E842B68D9D}" dt="2022-12-26T23:45:01.977" v="1069" actId="1076"/>
           <ac:picMkLst>
             <pc:docMk/>
             <pc:sldMk cId="2246430466" sldId="273"/>
             <ac:picMk id="5" creationId="{8F3395A2-7270-1BE2-13BD-EA2D5988B788}"/>
+          </ac:picMkLst>
+        </pc:picChg>
+      </pc:sldChg>
+      <pc:sldChg chg="addSp modSp new mod ord">
+        <pc:chgData name="Mikhail Khmelik" userId="6a76e1f3ea945fb9" providerId="LiveId" clId="{1C12B67B-2AEB-41DF-9B92-A9E842B68D9D}" dt="2022-12-26T23:44:54.311" v="1068" actId="1076"/>
+        <pc:sldMkLst>
+          <pc:docMk/>
+          <pc:sldMk cId="1574672055" sldId="274"/>
+        </pc:sldMkLst>
+        <pc:spChg chg="mod">
+          <ac:chgData name="Mikhail Khmelik" userId="6a76e1f3ea945fb9" providerId="LiveId" clId="{1C12B67B-2AEB-41DF-9B92-A9E842B68D9D}" dt="2022-12-26T23:44:45.141" v="1064" actId="20577"/>
+          <ac:spMkLst>
+            <pc:docMk/>
+            <pc:sldMk cId="1574672055" sldId="274"/>
+            <ac:spMk id="2" creationId="{60250DC3-2E0B-70BC-820D-C8785BABDF9E}"/>
+          </ac:spMkLst>
+        </pc:spChg>
+        <pc:picChg chg="add mod">
+          <ac:chgData name="Mikhail Khmelik" userId="6a76e1f3ea945fb9" providerId="LiveId" clId="{1C12B67B-2AEB-41DF-9B92-A9E842B68D9D}" dt="2022-12-26T23:44:54.311" v="1068" actId="1076"/>
+          <ac:picMkLst>
+            <pc:docMk/>
+            <pc:sldMk cId="1574672055" sldId="274"/>
+            <ac:picMk id="5" creationId="{87C7DA17-3A3A-B666-689D-F6A5B1AC0F97}"/>
           </ac:picMkLst>
         </pc:picChg>
       </pc:sldChg>
@@ -1254,7 +1278,7 @@
           <a:p>
             <a:fld id="{3566D785-E323-48E6-B2AF-F38245484FD6}" type="datetimeFigureOut">
               <a:rPr lang="en-GB" smtClean="0"/>
-              <a:t>25/12/2022</a:t>
+              <a:t>26/12/2022</a:t>
             </a:fld>
             <a:endParaRPr lang="en-GB"/>
           </a:p>
@@ -1673,7 +1697,7 @@
           <a:p>
             <a:fld id="{D1280127-7D1C-4D5E-BE64-B2FBED6E857F}" type="datetime1">
               <a:rPr lang="en-GB" smtClean="0"/>
-              <a:t>25/12/2022</a:t>
+              <a:t>26/12/2022</a:t>
             </a:fld>
             <a:endParaRPr lang="en-GB"/>
           </a:p>
@@ -1815,7 +1839,7 @@
           <a:p>
             <a:fld id="{C2C18883-EBE0-4DB6-9A1D-73D7C3707760}" type="datetime1">
               <a:rPr lang="en-GB" smtClean="0"/>
-              <a:t>25/12/2022</a:t>
+              <a:t>26/12/2022</a:t>
             </a:fld>
             <a:endParaRPr lang="en-GB"/>
           </a:p>
@@ -2060,7 +2084,7 @@
           <a:p>
             <a:fld id="{51890E51-CEA5-41AE-BB61-54227256A4B3}" type="datetime1">
               <a:rPr lang="en-GB" smtClean="0"/>
-              <a:t>25/12/2022</a:t>
+              <a:t>26/12/2022</a:t>
             </a:fld>
             <a:endParaRPr lang="en-GB"/>
           </a:p>
@@ -2624,7 +2648,7 @@
           <p:cNvPr id="2" name="Title 1">
             <a:extLst>
               <a:ext uri="{FF2B5EF4-FFF2-40B4-BE49-F238E27FC236}">
-                <a16:creationId xmlns:a16="http://schemas.microsoft.com/office/drawing/2014/main" id="{9CE0D559-F431-E87F-9357-ABCC790496B3}"/>
+                <a16:creationId xmlns:a16="http://schemas.microsoft.com/office/drawing/2014/main" id="{60250DC3-2E0B-70BC-820D-C8785BABDF9E}"/>
               </a:ext>
             </a:extLst>
           </p:cNvPr>
@@ -2642,20 +2666,9 @@
           <a:p>
             <a:r>
               <a:rPr lang="ru-RU" dirty="0"/>
-              <a:t>Мы можем пересмотреть маркетинговую стратегию: следует сфокусироваться на </a:t>
+              <a:t>Количество времени в игре не зависит от канала привлечения</a:t>
             </a:r>
-            <a:r>
-              <a:rPr lang="en-GB" dirty="0"/>
-              <a:t>YouTube </a:t>
-            </a:r>
-            <a:r>
-              <a:rPr lang="ru-RU" dirty="0"/>
-              <a:t>и </a:t>
-            </a:r>
-            <a:r>
-              <a:rPr lang="en-GB" dirty="0"/>
-              <a:t>Yandex</a:t>
-            </a:r>
+            <a:endParaRPr lang="en-GB" dirty="0"/>
           </a:p>
         </p:txBody>
       </p:sp>
@@ -2664,7 +2677,7 @@
           <p:cNvPr id="3" name="Slide Number Placeholder 2">
             <a:extLst>
               <a:ext uri="{FF2B5EF4-FFF2-40B4-BE49-F238E27FC236}">
-                <a16:creationId xmlns:a16="http://schemas.microsoft.com/office/drawing/2014/main" id="{DE26455C-3C8F-B0BB-A104-027738D8D126}"/>
+                <a16:creationId xmlns:a16="http://schemas.microsoft.com/office/drawing/2014/main" id="{54BA4AB4-DEB3-77F8-5547-6456A586DA8F}"/>
               </a:ext>
             </a:extLst>
           </p:cNvPr>
@@ -2693,7 +2706,7 @@
           <p:cNvPr id="5" name="Picture 4">
             <a:extLst>
               <a:ext uri="{FF2B5EF4-FFF2-40B4-BE49-F238E27FC236}">
-                <a16:creationId xmlns:a16="http://schemas.microsoft.com/office/drawing/2014/main" id="{8F3395A2-7270-1BE2-13BD-EA2D5988B788}"/>
+                <a16:creationId xmlns:a16="http://schemas.microsoft.com/office/drawing/2014/main" id="{87C7DA17-3A3A-B666-689D-F6A5B1AC0F97}"/>
               </a:ext>
             </a:extLst>
           </p:cNvPr>
@@ -2710,7 +2723,125 @@
         </p:blipFill>
         <p:spPr>
           <a:xfrm>
-            <a:off x="2733502" y="1419121"/>
+            <a:off x="2888736" y="900863"/>
+            <a:ext cx="5585121" cy="5318431"/>
+          </a:xfrm>
+          <a:prstGeom prst="rect">
+            <a:avLst/>
+          </a:prstGeom>
+        </p:spPr>
+      </p:pic>
+    </p:spTree>
+    <p:extLst>
+      <p:ext uri="{BB962C8B-B14F-4D97-AF65-F5344CB8AC3E}">
+        <p14:creationId xmlns:p14="http://schemas.microsoft.com/office/powerpoint/2010/main" val="1574672055"/>
+      </p:ext>
+    </p:extLst>
+  </p:cSld>
+  <p:clrMapOvr>
+    <a:masterClrMapping/>
+  </p:clrMapOvr>
+</p:sld>
+</file>
+
+<file path=ppt/slides/slide11.xml><?xml version="1.0" encoding="utf-8"?>
+<p:sld xmlns:a="http://schemas.openxmlformats.org/drawingml/2006/main" xmlns:r="http://schemas.openxmlformats.org/officeDocument/2006/relationships" xmlns:p="http://schemas.openxmlformats.org/presentationml/2006/main">
+  <p:cSld>
+    <p:spTree>
+      <p:nvGrpSpPr>
+        <p:cNvPr id="1" name=""/>
+        <p:cNvGrpSpPr/>
+        <p:nvPr/>
+      </p:nvGrpSpPr>
+      <p:grpSpPr>
+        <a:xfrm>
+          <a:off x="0" y="0"/>
+          <a:ext cx="0" cy="0"/>
+          <a:chOff x="0" y="0"/>
+          <a:chExt cx="0" cy="0"/>
+        </a:xfrm>
+      </p:grpSpPr>
+      <p:sp>
+        <p:nvSpPr>
+          <p:cNvPr id="2" name="Title 1">
+            <a:extLst>
+              <a:ext uri="{FF2B5EF4-FFF2-40B4-BE49-F238E27FC236}">
+                <a16:creationId xmlns:a16="http://schemas.microsoft.com/office/drawing/2014/main" id="{9CE0D559-F431-E87F-9357-ABCC790496B3}"/>
+              </a:ext>
+            </a:extLst>
+          </p:cNvPr>
+          <p:cNvSpPr>
+            <a:spLocks noGrp="1"/>
+          </p:cNvSpPr>
+          <p:nvPr>
+            <p:ph type="title"/>
+          </p:nvPr>
+        </p:nvSpPr>
+        <p:spPr/>
+        <p:txBody>
+          <a:bodyPr/>
+          <a:lstStyle/>
+          <a:p>
+            <a:r>
+              <a:rPr lang="ru-RU" dirty="0"/>
+              <a:t>Мы можем пересмотреть маркетинговую стратегию: следует приоритезировать дешевые каналы в первую очередь</a:t>
+            </a:r>
+            <a:endParaRPr lang="en-GB" dirty="0"/>
+          </a:p>
+        </p:txBody>
+      </p:sp>
+      <p:sp>
+        <p:nvSpPr>
+          <p:cNvPr id="3" name="Slide Number Placeholder 2">
+            <a:extLst>
+              <a:ext uri="{FF2B5EF4-FFF2-40B4-BE49-F238E27FC236}">
+                <a16:creationId xmlns:a16="http://schemas.microsoft.com/office/drawing/2014/main" id="{DE26455C-3C8F-B0BB-A104-027738D8D126}"/>
+              </a:ext>
+            </a:extLst>
+          </p:cNvPr>
+          <p:cNvSpPr>
+            <a:spLocks noGrp="1"/>
+          </p:cNvSpPr>
+          <p:nvPr>
+            <p:ph type="sldNum" sz="quarter" idx="12"/>
+          </p:nvPr>
+        </p:nvSpPr>
+        <p:spPr/>
+        <p:txBody>
+          <a:bodyPr/>
+          <a:lstStyle/>
+          <a:p>
+            <a:fld id="{E0DC3677-8C5A-44E3-90EE-94ACB1AA52DF}" type="slidenum">
+              <a:rPr lang="en-GB" smtClean="0"/>
+              <a:t>11</a:t>
+            </a:fld>
+            <a:endParaRPr lang="en-GB"/>
+          </a:p>
+        </p:txBody>
+      </p:sp>
+      <p:pic>
+        <p:nvPicPr>
+          <p:cNvPr id="5" name="Picture 4">
+            <a:extLst>
+              <a:ext uri="{FF2B5EF4-FFF2-40B4-BE49-F238E27FC236}">
+                <a16:creationId xmlns:a16="http://schemas.microsoft.com/office/drawing/2014/main" id="{8F3395A2-7270-1BE2-13BD-EA2D5988B788}"/>
+              </a:ext>
+            </a:extLst>
+          </p:cNvPr>
+          <p:cNvPicPr>
+            <a:picLocks noChangeAspect="1"/>
+          </p:cNvPicPr>
+          <p:nvPr/>
+        </p:nvPicPr>
+        <p:blipFill>
+          <a:blip r:embed="rId2"/>
+          <a:stretch>
+            <a:fillRect/>
+          </a:stretch>
+        </p:blipFill>
+        <p:spPr>
+          <a:xfrm>
+            <a:off x="2733502" y="1650147"/>
             <a:ext cx="6724996" cy="4019757"/>
           </a:xfrm>
           <a:prstGeom prst="rect">
@@ -2821,7 +2952,7 @@
         <p:spPr>
           <a:xfrm>
             <a:off x="838200" y="1430706"/>
-            <a:ext cx="10454014" cy="4093428"/>
+            <a:ext cx="10454014" cy="4308872"/>
           </a:xfrm>
           <a:prstGeom prst="rect">
             <a:avLst/>
@@ -2854,7 +2985,7 @@
                 <a:latin typeface="Arial" panose="020B0604020202020204" pitchFamily="34" charset="0"/>
                 <a:cs typeface="Arial" panose="020B0604020202020204" pitchFamily="34" charset="0"/>
               </a:rPr>
-              <a:t>2. Из 13.5К уникальных пользователей 5.8К завершили первый уровень. Большинство (около 2/3) этих игроков прошли уровень через PvP. Остальные игроки завершили `satelite_orbital_assembly`.</a:t>
+              <a:t>2. Из 13.5К уникальных пользователей 5.8К завершили первый уровень. Большинство (около 2/3) этих игроков прошли уровень через PvP. Остальные игроки завершили `satelite_orbital_assembly`. Это может говорить о некотором дисбалансе в том, как игроки проходят уровень - следует уведомить наших геймдизайнеров, чтобы PvE путь совсем не исчез (а также, чтобы мы заработали больше денег).</a:t>
             </a:r>
           </a:p>
           <a:p>
@@ -2899,7 +3030,7 @@
                 <a:latin typeface="Arial" panose="020B0604020202020204" pitchFamily="34" charset="0"/>
                 <a:cs typeface="Arial" panose="020B0604020202020204" pitchFamily="34" charset="0"/>
               </a:rPr>
-              <a:t>5. В следующей итерации, мы можем пересмотреть наш маркетинг: YouTube и Yandex оказались самыми дешевыми источниками. Через Yandex пришло большинство игроков. Т.к. количество построек не различается от канала привлечения (скорей всего количество времени не отличается тоже), то чтобы повысить ROI нам придется сфокусироваться на сокращении затрат на неэффективные каналы.</a:t>
+              <a:t>5. В следующей итерации, мы можем пересмотреть наш маркетинг: стоит приоритизировать дешевые каналы в первую очередь (YouTube, Yandex, Instagram, Facebook), т.к. время игроков в приложении не зависит от источника трафика. Это значит и наша потенциальная выручка от рекламы тоже не будет меняться.</a:t>
             </a:r>
             <a:endParaRPr lang="ru-RU" sz="1400" b="0" dirty="0">
               <a:effectLst/>

</xml_diff>